<commit_message>
Photon Synchronization Tutorial Renewal
- Delete terrain object

- Photon Synchronization Manual
  Remake
</commit_message>
<xml_diff>
--- a/Assets/Class/Collision/PPT Data/Collision Example.pptx
+++ b/Assets/Class/Collision/PPT Data/Collision Example.pptx
@@ -2,7 +2,7 @@
 <file path=ppt/presentation.xml><?xml version="1.0" encoding="utf-8"?>
 <p:presentation xmlns:a="http://schemas.openxmlformats.org/drawingml/2006/main" xmlns:r="http://schemas.openxmlformats.org/officeDocument/2006/relationships" xmlns:p="http://schemas.openxmlformats.org/presentationml/2006/main" xmlns:p14="http://schemas.microsoft.com/office/powerpoint/2010/main" saveSubsetFonts="1" firstSlideNum="0">
   <p:sldMasterIdLst>
-    <p:sldMasterId id="2147485296" r:id="rId12"/>
+    <p:sldMasterId id="2147485298" r:id="rId12"/>
   </p:sldMasterIdLst>
   <p:notesMasterIdLst>
     <p:notesMasterId r:id="rId14"/>
@@ -5591,17 +5591,17 @@
       </p:pic>
       <p:pic>
         <p:nvPicPr>
-          <p:cNvPr id="14" name="그림 10"/>
+          <p:cNvPr id="14" name="그림 10" descr="C:/Users/Admin1/AppData/Roaming/PolarisOffice/ETemp/20632_8186048/fImage44681028467.png"/>
           <p:cNvPicPr>
             <a:picLocks noChangeAspect="1"/>
           </p:cNvPicPr>
           <p:nvPr/>
         </p:nvPicPr>
         <p:blipFill rotWithShape="1">
-          <a:blip r:embed="rId8" cstate="print">
+          <a:blip r:embed="rId8" cstate="hqprint">
             <a:extLst>
               <a:ext uri="{28A0092B-C50C-407E-A947-70E740481C1C}">
-                <a14:useLocalDpi xmlns:a14="http://schemas.microsoft.com/office/drawing/2010/main" val="0"/>
+                <a14:useLocalDpi xmlns:a14="http://schemas.microsoft.com/office/drawing/2010/main"/>
               </a:ext>
             </a:extLst>
           </a:blip>
@@ -5612,10 +5612,12 @@
         <p:spPr>
           <a:xfrm rot="0">
             <a:off x="3649345" y="1313180"/>
-            <a:ext cx="1716405" cy="915035"/>
-          </a:xfrm>
-          <a:prstGeom prst="rect"/>
-          <a:noFill/>
+            <a:ext cx="1717040" cy="915670"/>
+          </a:xfrm>
+          <a:prstGeom prst="roundRect"/>
+          <a:solidFill>
+            <a:srgbClr val="EDEDED"/>
+          </a:solidFill>
         </p:spPr>
       </p:pic>
       <p:pic>
@@ -5725,17 +5727,17 @@
       </p:sp>
       <p:pic>
         <p:nvPicPr>
-          <p:cNvPr id="18" name="그림 16"/>
+          <p:cNvPr id="18" name="그림 16" descr="C:/Users/Admin1/AppData/Roaming/PolarisOffice/ETemp/20632_8186048/fImage45761066500.png"/>
           <p:cNvPicPr>
             <a:picLocks noChangeAspect="1"/>
           </p:cNvPicPr>
           <p:nvPr/>
         </p:nvPicPr>
         <p:blipFill rotWithShape="1">
-          <a:blip r:embed="rId10" cstate="print">
+          <a:blip r:embed="rId10" cstate="hqprint">
             <a:extLst>
               <a:ext uri="{28A0092B-C50C-407E-A947-70E740481C1C}">
-                <a14:useLocalDpi xmlns:a14="http://schemas.microsoft.com/office/drawing/2010/main" val="0"/>
+                <a14:useLocalDpi xmlns:a14="http://schemas.microsoft.com/office/drawing/2010/main"/>
               </a:ext>
             </a:extLst>
           </a:blip>
@@ -5746,10 +5748,12 @@
         <p:spPr>
           <a:xfrm rot="0">
             <a:off x="6823075" y="1313180"/>
-            <a:ext cx="2379980" cy="944245"/>
-          </a:xfrm>
-          <a:prstGeom prst="rect"/>
-          <a:noFill/>
+            <a:ext cx="2380615" cy="944880"/>
+          </a:xfrm>
+          <a:prstGeom prst="roundRect"/>
+          <a:solidFill>
+            <a:srgbClr val="EDEDED"/>
+          </a:solidFill>
         </p:spPr>
       </p:pic>
       <p:cxnSp>
@@ -5789,17 +5793,17 @@
       </p:cxnSp>
       <p:pic>
         <p:nvPicPr>
-          <p:cNvPr id="19" name="그림 17"/>
+          <p:cNvPr id="19" name="그림 17" descr="C:/Users/Admin1/AppData/Roaming/PolarisOffice/ETemp/20632_8186048/fImage47031079169.png"/>
           <p:cNvPicPr>
             <a:picLocks noChangeAspect="1"/>
           </p:cNvPicPr>
           <p:nvPr/>
         </p:nvPicPr>
         <p:blipFill rotWithShape="1">
-          <a:blip r:embed="rId11" cstate="print">
+          <a:blip r:embed="rId11" cstate="hqprint">
             <a:extLst>
               <a:ext uri="{28A0092B-C50C-407E-A947-70E740481C1C}">
-                <a14:useLocalDpi xmlns:a14="http://schemas.microsoft.com/office/drawing/2010/main" val="0"/>
+                <a14:useLocalDpi xmlns:a14="http://schemas.microsoft.com/office/drawing/2010/main"/>
               </a:ext>
             </a:extLst>
           </a:blip>
@@ -5810,10 +5814,12 @@
         <p:spPr>
           <a:xfrm rot="0">
             <a:off x="6825615" y="3482975"/>
-            <a:ext cx="3874135" cy="1247775"/>
-          </a:xfrm>
-          <a:prstGeom prst="rect"/>
-          <a:noFill/>
+            <a:ext cx="3874770" cy="1248410"/>
+          </a:xfrm>
+          <a:prstGeom prst="roundRect"/>
+          <a:solidFill>
+            <a:srgbClr val="EDEDED"/>
+          </a:solidFill>
         </p:spPr>
       </p:pic>
       <p:sp>

</xml_diff>

<commit_message>
Photon Voice Tutorial Renewal
- Photon Voice material update
</commit_message>
<xml_diff>
--- a/Assets/Class/Collision/PPT Data/Collision Example.pptx
+++ b/Assets/Class/Collision/PPT Data/Collision Example.pptx
@@ -2,7 +2,7 @@
 <file path=ppt/presentation.xml><?xml version="1.0" encoding="utf-8"?>
 <p:presentation xmlns:a="http://schemas.openxmlformats.org/drawingml/2006/main" xmlns:r="http://schemas.openxmlformats.org/officeDocument/2006/relationships" xmlns:p="http://schemas.openxmlformats.org/presentationml/2006/main" xmlns:p14="http://schemas.microsoft.com/office/powerpoint/2010/main" saveSubsetFonts="1" firstSlideNum="0">
   <p:sldMasterIdLst>
-    <p:sldMasterId id="2147485334" r:id="rId12"/>
+    <p:sldMasterId id="2147485343" r:id="rId12"/>
   </p:sldMasterIdLst>
   <p:notesMasterIdLst>
     <p:notesMasterId r:id="rId14"/>
@@ -16,6 +16,7 @@
     <p:sldId id="281" r:id="rId21"/>
     <p:sldId id="280" r:id="rId22"/>
     <p:sldId id="282" r:id="rId23"/>
+    <p:sldId id="284" r:id="rId24"/>
   </p:sldIdLst>
   <p:sldSz cx="12192000" cy="6858000"/>
   <p:notesSz cx="6858000" cy="9144000"/>
@@ -5770,7 +5771,7 @@
       </p:sp>
       <p:pic>
         <p:nvPicPr>
-          <p:cNvPr id="19" name="그림 17" descr="C:/Users/Admin1/AppData/Roaming/PolarisOffice/ETemp/2512_10073344/fImage47031079169.png"/>
+          <p:cNvPr id="19" name="그림 17"/>
           <p:cNvPicPr>
             <a:picLocks noChangeAspect="1"/>
           </p:cNvPicPr>
@@ -5906,7 +5907,7 @@
       </p:pic>
       <p:pic>
         <p:nvPicPr>
-          <p:cNvPr id="22" name="그림 1" descr="C:/Users/Admin1/AppData/Roaming/PolarisOffice/ETemp/2512_10073344/fImage442710041.png"/>
+          <p:cNvPr id="22" name="그림 1"/>
           <p:cNvPicPr>
             <a:picLocks noChangeAspect="1"/>
           </p:cNvPicPr>
@@ -6327,7 +6328,7 @@
       </p:pic>
       <p:pic>
         <p:nvPicPr>
-          <p:cNvPr id="25" name="그림 4" descr="C:/Users/Admin1/AppData/Roaming/PolarisOffice/ETemp/2512_10073344/fImage47631018467.png"/>
+          <p:cNvPr id="25" name="그림 4"/>
           <p:cNvPicPr>
             <a:picLocks noChangeAspect="1"/>
           </p:cNvPicPr>
@@ -6606,7 +6607,7 @@
       </p:sp>
       <p:pic>
         <p:nvPicPr>
-          <p:cNvPr id="21" name="그림 32" descr="C:/Users/Admin1/AppData/Roaming/PolarisOffice/ETemp/2512_10073344/fImage161052045705.png"/>
+          <p:cNvPr id="21" name="그림 32"/>
           <p:cNvPicPr>
             <a:picLocks noChangeAspect="1"/>
           </p:cNvPicPr>
@@ -6637,7 +6638,7 @@
       </p:pic>
       <p:pic>
         <p:nvPicPr>
-          <p:cNvPr id="23" name="그림 34" descr="C:/Users/Admin1/AppData/Roaming/PolarisOffice/ETemp/2512_10073344/fImage91272063281.png"/>
+          <p:cNvPr id="23" name="그림 34"/>
           <p:cNvPicPr>
             <a:picLocks noChangeAspect="1"/>
           </p:cNvPicPr>
@@ -6668,7 +6669,7 @@
       </p:pic>
       <p:pic>
         <p:nvPicPr>
-          <p:cNvPr id="25" name="그림 19" descr="C:/Users/Admin1/AppData/Roaming/PolarisOffice/ETemp/2512_10073344/fImage972210841.png"/>
+          <p:cNvPr id="25" name="그림 19"/>
           <p:cNvPicPr>
             <a:picLocks noChangeAspect="1"/>
           </p:cNvPicPr>
@@ -6699,7 +6700,7 @@
       </p:pic>
       <p:pic>
         <p:nvPicPr>
-          <p:cNvPr id="26" name="그림 11" descr="C:/Users/Admin1/AppData/Roaming/PolarisOffice/ETemp/2512_10073344/fImage53461026334.png"/>
+          <p:cNvPr id="26" name="그림 11"/>
           <p:cNvPicPr>
             <a:picLocks noChangeAspect="1"/>
           </p:cNvPicPr>
@@ -6730,7 +6731,7 @@
       </p:pic>
       <p:pic>
         <p:nvPicPr>
-          <p:cNvPr id="27" name="그림 14" descr="C:/Users/Admin1/AppData/Roaming/PolarisOffice/ETemp/2512_10073344/fImage53461036500.png"/>
+          <p:cNvPr id="27" name="그림 14"/>
           <p:cNvPicPr>
             <a:picLocks noChangeAspect="1"/>
           </p:cNvPicPr>
@@ -6761,7 +6762,7 @@
       </p:pic>
       <p:pic>
         <p:nvPicPr>
-          <p:cNvPr id="28" name="그림 15" descr="C:/Users/Admin1/AppData/Roaming/PolarisOffice/ETemp/2512_10073344/fImage107461049169.png"/>
+          <p:cNvPr id="28" name="그림 15"/>
           <p:cNvPicPr>
             <a:picLocks noChangeAspect="1"/>
           </p:cNvPicPr>
@@ -6914,8 +6915,8 @@
         </p:nvSpPr>
         <p:spPr>
           <a:xfrm rot="0">
-            <a:off x="4876800" y="394335"/>
-            <a:ext cx="2449830" cy="554990"/>
+            <a:off x="4511040" y="369570"/>
+            <a:ext cx="3162300" cy="554990"/>
           </a:xfrm>
           <a:prstGeom prst="rect"/>
           <a:noFill/>
@@ -6942,7 +6943,7 @@
                 <a:latin typeface="맑은 고딕" charset="0"/>
                 <a:ea typeface="맑은 고딕" charset="0"/>
               </a:rPr>
-              <a:t>네</a:t>
+              <a:t>네 번째 </a:t>
             </a:r>
             <a:r>
               <a:rPr lang="ko-KR" sz="3000" b="1">
@@ -6952,7 +6953,7 @@
                 <a:latin typeface="맑은 고딕" charset="0"/>
                 <a:ea typeface="맑은 고딕" charset="0"/>
               </a:rPr>
-              <a:t> 번째 과정</a:t>
+              <a:t>튜토리얼</a:t>
             </a:r>
             <a:endParaRPr lang="ko-KR" altLang="en-US" sz="3000" b="1">
               <a:solidFill>
@@ -7067,7 +7068,7 @@
       </p:sp>
       <p:pic>
         <p:nvPicPr>
-          <p:cNvPr id="21" name="그림 51" descr="C:/Users/Admin1/AppData/Roaming/PolarisOffice/ETemp/2512_10073344/fImage46372242995.png"/>
+          <p:cNvPr id="21" name="그림 51"/>
           <p:cNvPicPr>
             <a:picLocks noChangeAspect="1"/>
           </p:cNvPicPr>
@@ -7096,7 +7097,7 @@
       </p:pic>
       <p:pic>
         <p:nvPicPr>
-          <p:cNvPr id="22" name="그림 54" descr="C:/Users/Admin1/AppData/Roaming/PolarisOffice/ETemp/2512_10073344/fImage79902251942.png"/>
+          <p:cNvPr id="22" name="그림 54"/>
           <p:cNvPicPr>
             <a:picLocks noChangeAspect="1"/>
           </p:cNvPicPr>
@@ -7274,8 +7275,8 @@
         </p:nvSpPr>
         <p:spPr>
           <a:xfrm rot="0">
-            <a:off x="4697095" y="402590"/>
-            <a:ext cx="2797175" cy="554990"/>
+            <a:off x="4314825" y="427355"/>
+            <a:ext cx="3566795" cy="554990"/>
           </a:xfrm>
           <a:prstGeom prst="rect"/>
           <a:noFill/>
@@ -7302,7 +7303,7 @@
                 <a:latin typeface="맑은 고딕" charset="0"/>
                 <a:ea typeface="맑은 고딕" charset="0"/>
               </a:rPr>
-              <a:t>여섯</a:t>
+              <a:t>다</a:t>
             </a:r>
             <a:r>
               <a:rPr lang="ko-KR" sz="3000" b="1">
@@ -7312,7 +7313,17 @@
                 <a:latin typeface="맑은 고딕" charset="0"/>
                 <a:ea typeface="맑은 고딕" charset="0"/>
               </a:rPr>
-              <a:t> 번째 과정</a:t>
+              <a:t>섯 번째 </a:t>
+            </a:r>
+            <a:r>
+              <a:rPr lang="ko-KR" sz="3000" b="1">
+                <a:solidFill>
+                  <a:schemeClr val="tx1"/>
+                </a:solidFill>
+                <a:latin typeface="맑은 고딕" charset="0"/>
+                <a:ea typeface="맑은 고딕" charset="0"/>
+              </a:rPr>
+              <a:t>튜토리얼</a:t>
             </a:r>
             <a:endParaRPr lang="ko-KR" altLang="en-US" sz="3000" b="1">
               <a:solidFill>
@@ -7492,7 +7503,7 @@
       </p:sp>
       <p:pic>
         <p:nvPicPr>
-          <p:cNvPr id="39" name="그림 34" descr="C:/Users/Admin1/AppData/Roaming/PolarisOffice/ETemp/2512_10073344/fImage55441115724.png"/>
+          <p:cNvPr id="39" name="그림 34"/>
           <p:cNvPicPr>
             <a:picLocks noChangeAspect="1"/>
           </p:cNvPicPr>
@@ -7523,7 +7534,7 @@
       </p:pic>
       <p:pic>
         <p:nvPicPr>
-          <p:cNvPr id="40" name="그림 37" descr="C:/Users/Admin1/AppData/Roaming/PolarisOffice/ETemp/2512_10073344/fImage63851121478.png"/>
+          <p:cNvPr id="40" name="그림 37"/>
           <p:cNvPicPr>
             <a:picLocks noChangeAspect="1"/>
           </p:cNvPicPr>
@@ -7628,7 +7639,7 @@
       </p:sp>
       <p:pic>
         <p:nvPicPr>
-          <p:cNvPr id="42" name="그림 41" descr="C:/Users/Admin1/AppData/Roaming/PolarisOffice/ETemp/2512_10073344/fImage70481149358.png"/>
+          <p:cNvPr id="42" name="그림 41"/>
           <p:cNvPicPr>
             <a:picLocks noChangeAspect="1"/>
           </p:cNvPicPr>
@@ -7659,7 +7670,7 @@
       </p:pic>
       <p:pic>
         <p:nvPicPr>
-          <p:cNvPr id="43" name="그림 48" descr="C:/Users/Admin1/AppData/Roaming/PolarisOffice/ETemp/2512_10073344/fImage134901156962.png"/>
+          <p:cNvPr id="43" name="그림 48"/>
           <p:cNvPicPr>
             <a:picLocks noChangeAspect="1"/>
           </p:cNvPicPr>
@@ -7690,7 +7701,7 @@
       </p:pic>
       <p:pic>
         <p:nvPicPr>
-          <p:cNvPr id="44" name="그림 52" descr="C:/Users/Admin1/AppData/Roaming/PolarisOffice/ETemp/2512_10073344/fImage53941174464.png"/>
+          <p:cNvPr id="44" name="그림 52"/>
           <p:cNvPicPr>
             <a:picLocks noChangeAspect="1"/>
           </p:cNvPicPr>
@@ -7842,9 +7853,9 @@
           <p:nvPr/>
         </p:nvSpPr>
         <p:spPr>
-          <a:xfrm>
-            <a:off x="4697095" y="402590"/>
-            <a:ext cx="2796540" cy="554990"/>
+          <a:xfrm rot="0">
+            <a:off x="4347845" y="419100"/>
+            <a:ext cx="3500120" cy="554990"/>
           </a:xfrm>
           <a:prstGeom prst="rect"/>
           <a:noFill/>
@@ -7871,7 +7882,7 @@
                 <a:latin typeface="맑은 고딕" charset="0"/>
                 <a:ea typeface="맑은 고딕" charset="0"/>
               </a:rPr>
-              <a:t>일곱</a:t>
+              <a:t>여섯</a:t>
             </a:r>
             <a:r>
               <a:rPr lang="ko-KR" sz="3000" b="1">
@@ -7881,7 +7892,17 @@
                 <a:latin typeface="맑은 고딕" charset="0"/>
                 <a:ea typeface="맑은 고딕" charset="0"/>
               </a:rPr>
-              <a:t> 번째 과정</a:t>
+              <a:t> 번째 </a:t>
+            </a:r>
+            <a:r>
+              <a:rPr lang="ko-KR" sz="3000" b="1">
+                <a:solidFill>
+                  <a:schemeClr val="tx1"/>
+                </a:solidFill>
+                <a:latin typeface="맑은 고딕" charset="0"/>
+                <a:ea typeface="맑은 고딕" charset="0"/>
+              </a:rPr>
+              <a:t>튜토리얼</a:t>
             </a:r>
             <a:endParaRPr lang="ko-KR" altLang="en-US" sz="3000" b="1">
               <a:solidFill>
@@ -8074,7 +8095,7 @@
       </p:sp>
       <p:pic>
         <p:nvPicPr>
-          <p:cNvPr id="32" name="그림 56" descr="C:/Users/Admin1/AppData/Roaming/PolarisOffice/ETemp/2512_10073344/fImage20671195705.png"/>
+          <p:cNvPr id="32" name="그림 56"/>
           <p:cNvPicPr>
             <a:picLocks noChangeAspect="1"/>
           </p:cNvPicPr>
@@ -8105,7 +8126,7 @@
       </p:pic>
       <p:pic>
         <p:nvPicPr>
-          <p:cNvPr id="33" name="그림 60" descr="C:/Users/Admin1/AppData/Roaming/PolarisOffice/ETemp/2512_10073344/fImage53461218145.png"/>
+          <p:cNvPr id="33" name="그림 60"/>
           <p:cNvPicPr>
             <a:picLocks noChangeAspect="1"/>
           </p:cNvPicPr>
@@ -8171,7 +8192,7 @@
       </p:cxnSp>
       <p:pic>
         <p:nvPicPr>
-          <p:cNvPr id="35" name="그림 62" descr="C:/Users/Admin1/AppData/Roaming/PolarisOffice/ETemp/2512_10073344/fImage97581233281.png"/>
+          <p:cNvPr id="35" name="그림 62"/>
           <p:cNvPicPr>
             <a:picLocks noChangeAspect="1"/>
           </p:cNvPicPr>
@@ -8331,7 +8352,7 @@
       </p:sp>
       <p:pic>
         <p:nvPicPr>
-          <p:cNvPr id="37" name="그림 66" descr="C:/Users/Admin1/AppData/Roaming/PolarisOffice/ETemp/2512_10073344/fImage20929936334.png"/>
+          <p:cNvPr id="37" name="그림 66"/>
           <p:cNvPicPr>
             <a:picLocks noChangeAspect="1"/>
           </p:cNvPicPr>
@@ -8407,9 +8428,9 @@
           <p:nvPr/>
         </p:nvSpPr>
         <p:spPr>
-          <a:xfrm rot="0">
+          <a:xfrm>
             <a:off x="4697095" y="402590"/>
-            <a:ext cx="2795905" cy="554990"/>
+            <a:ext cx="2796540" cy="554990"/>
           </a:xfrm>
           <a:prstGeom prst="rect"/>
           <a:noFill/>
@@ -8436,7 +8457,7 @@
                 <a:latin typeface="맑은 고딕" charset="0"/>
                 <a:ea typeface="맑은 고딕" charset="0"/>
               </a:rPr>
-              <a:t>다섯</a:t>
+              <a:t>일곱</a:t>
             </a:r>
             <a:r>
               <a:rPr lang="ko-KR" sz="3000" b="1">
@@ -8690,7 +8711,7 @@
       </p:sp>
       <p:pic>
         <p:nvPicPr>
-          <p:cNvPr id="24" name="그림 63" descr="C:/Users/Admin1/AppData/Roaming/PolarisOffice/ETemp/2512_10073344/fImage538602334827.png"/>
+          <p:cNvPr id="24" name="그림 63"/>
           <p:cNvPicPr>
             <a:picLocks noChangeAspect="1"/>
           </p:cNvPicPr>
@@ -8719,7 +8740,7 @@
       </p:pic>
       <p:pic>
         <p:nvPicPr>
-          <p:cNvPr id="25" name="그림 64" descr="C:/Users/Admin1/AppData/Roaming/PolarisOffice/ETemp/2512_10073344/fImage133022345436.png"/>
+          <p:cNvPr id="25" name="그림 64"/>
           <p:cNvPicPr>
             <a:picLocks noChangeAspect="1"/>
           </p:cNvPicPr>
@@ -8777,7 +8798,7 @@
       </p:pic>
       <p:pic>
         <p:nvPicPr>
-          <p:cNvPr id="27" name="그림 68" descr="C:/Users/Admin1/AppData/Roaming/PolarisOffice/ETemp/2512_10073344/fImage538602384604.png"/>
+          <p:cNvPr id="27" name="그림 68"/>
           <p:cNvPicPr>
             <a:picLocks noChangeAspect="1"/>
           </p:cNvPicPr>
@@ -8835,7 +8856,7 @@
       </p:pic>
       <p:pic>
         <p:nvPicPr>
-          <p:cNvPr id="29" name="그림 70" descr="C:/Users/Admin1/AppData/Roaming/PolarisOffice/ETemp/2512_10073344/fImage53860240153.png"/>
+          <p:cNvPr id="29" name="그림 70"/>
           <p:cNvPicPr>
             <a:picLocks noChangeAspect="1"/>
           </p:cNvPicPr>
@@ -9064,7 +9085,7 @@
       </p:sp>
       <p:pic>
         <p:nvPicPr>
-          <p:cNvPr id="36" name="그림 30" descr="C:/Users/Admin1/AppData/Roaming/PolarisOffice/ETemp/2512_10073344/fImage1994931096827.png"/>
+          <p:cNvPr id="36" name="그림 30"/>
           <p:cNvPicPr>
             <a:picLocks noChangeAspect="1"/>
           </p:cNvPicPr>
@@ -9102,9 +9123,9 @@
           <p:nvPr/>
         </p:nvSpPr>
         <p:spPr>
-          <a:xfrm rot="0">
+          <a:xfrm>
             <a:off x="6824980" y="5211445"/>
-            <a:ext cx="4258945" cy="954405"/>
+            <a:ext cx="4259580" cy="954405"/>
           </a:xfrm>
           <a:prstGeom prst="rect"/>
           <a:noFill/>
@@ -9141,7 +9162,7 @@
                 <a:latin typeface="맑은 고딕" charset="0"/>
                 <a:ea typeface="맑은 고딕" charset="0"/>
               </a:rPr>
-              <a:t>9</a:t>
+              <a:t>8</a:t>
             </a:r>
             <a:r>
               <a:rPr sz="2000" b="1">
@@ -9158,28 +9179,7 @@
                 <a:latin typeface="맑은 고딕" charset="0"/>
                 <a:ea typeface="맑은 고딕" charset="0"/>
               </a:rPr>
-              <a:t>이제</a:t>
-            </a:r>
-            <a:r>
-              <a:rPr lang="ko-KR" sz="1800">
-                <a:latin typeface="맑은 고딕" charset="0"/>
-                <a:ea typeface="맑은 고딕" charset="0"/>
-              </a:rPr>
-              <a:t> Character 오브젝트를 선택하고 스크립트의 speed 변수</a:t>
-            </a:r>
-            <a:r>
-              <a:rPr lang="ko-KR" sz="1800">
-                <a:latin typeface="맑은 고딕" charset="0"/>
-                <a:ea typeface="맑은 고딕" charset="0"/>
-              </a:rPr>
-              <a:t>의</a:t>
-            </a:r>
-            <a:r>
-              <a:rPr lang="ko-KR" sz="1800">
-                <a:latin typeface="맑은 고딕" charset="0"/>
-                <a:ea typeface="맑은 고딕" charset="0"/>
-              </a:rPr>
-              <a:t> 값을 조정하여 게임을 실행합니다.</a:t>
+              <a:t>이제 Character 오브젝트를 선택하고 스크립트의 speed 변수의 값을 조정하여 게임을 실행합니다.</a:t>
             </a:r>
             <a:endParaRPr lang="ko-KR" altLang="en-US" sz="1800">
               <a:latin typeface="맑은 고딕" charset="0"/>
@@ -9190,7 +9190,7 @@
       </p:sp>
       <p:pic>
         <p:nvPicPr>
-          <p:cNvPr id="38" name="그림 68" descr="C:/Users/Admin1/AppData/Roaming/PolarisOffice/ETemp/2512_10073344/fImage290551748467.png"/>
+          <p:cNvPr id="38" name="그림 68"/>
           <p:cNvPicPr>
             <a:picLocks noChangeAspect="1"/>
           </p:cNvPicPr>
@@ -9215,6 +9215,201 @@
           </a:xfrm>
           <a:prstGeom prst="rect"/>
           <a:noFill/>
+        </p:spPr>
+      </p:pic>
+    </p:spTree>
+  </p:cSld>
+  <p:clrMapOvr>
+    <a:masterClrMapping/>
+  </p:clrMapOvr>
+  <mc:AlternateContent xmlns:mc="http://schemas.openxmlformats.org/markup-compatibility/2006">
+    <mc:Choice xmlns:p14="http://schemas.microsoft.com/office/powerpoint/2010/main" Requires="p14">
+      <p:transition spd="slow" p14:dur="1000"/>
+    </mc:Choice>
+    <mc:Fallback>
+      <p:transition spd="slow"/>
+    </mc:Fallback>
+  </mc:AlternateContent>
+  <p:timing>
+    <p:tnLst>
+      <p:par>
+        <p:cTn id="1" dur="indefinite" restart="never" nodeType="tmRoot"/>
+      </p:par>
+    </p:tnLst>
+  </p:timing>
+</p:sld>
+</file>
+
+<file path=ppt/slides/slide9.xml><?xml version="1.0" encoding="utf-8"?>
+<p:sld xmlns:a="http://schemas.openxmlformats.org/drawingml/2006/main" xmlns:r="http://schemas.openxmlformats.org/officeDocument/2006/relationships" xmlns:p="http://schemas.openxmlformats.org/presentationml/2006/main">
+  <p:cSld>
+    <p:spTree>
+      <p:nvGrpSpPr>
+        <p:cNvPr id="1" name=""/>
+        <p:cNvGrpSpPr/>
+        <p:nvPr/>
+      </p:nvGrpSpPr>
+      <p:grpSpPr>
+        <a:xfrm>
+          <a:off x="0" y="0"/>
+          <a:ext cx="0" cy="0"/>
+          <a:chOff x="0" y="0"/>
+          <a:chExt cx="0" cy="0"/>
+        </a:xfrm>
+      </p:grpSpPr>
+      <p:sp>
+        <p:nvSpPr>
+          <p:cNvPr id="2" name="Rect 0"/>
+          <p:cNvSpPr txBox="1">
+            <a:spLocks/>
+          </p:cNvSpPr>
+          <p:nvPr/>
+        </p:nvSpPr>
+        <p:spPr>
+          <a:xfrm rot="0">
+            <a:off x="4697095" y="402590"/>
+            <a:ext cx="2797810" cy="554990"/>
+          </a:xfrm>
+          <a:prstGeom prst="rect"/>
+          <a:noFill/>
+          <a:ln w="0">
+            <a:noFill/>
+            <a:prstDash/>
+          </a:ln>
+        </p:spPr>
+        <p:txBody>
+          <a:bodyPr wrap="square" lIns="89535" tIns="46355" rIns="89535" bIns="46355" numCol="1" vert="horz" anchor="t">
+            <a:spAutoFit/>
+          </a:bodyPr>
+          <a:lstStyle/>
+          <a:p>
+            <a:pPr marL="0" indent="0" rtl="0" algn="l" defTabSz="914400" eaLnBrk="1" latinLnBrk="0" hangingPunct="1">
+              <a:buFontTx/>
+              <a:buNone/>
+            </a:pPr>
+            <a:r>
+              <a:rPr lang="ko-KR" sz="3000" b="1">
+                <a:solidFill>
+                  <a:schemeClr val="tx1"/>
+                </a:solidFill>
+                <a:latin typeface="맑은 고딕" charset="0"/>
+                <a:ea typeface="맑은 고딕" charset="0"/>
+              </a:rPr>
+              <a:t>아홉</a:t>
+            </a:r>
+            <a:r>
+              <a:rPr lang="ko-KR" sz="3000" b="1">
+                <a:solidFill>
+                  <a:schemeClr val="tx1"/>
+                </a:solidFill>
+                <a:latin typeface="맑은 고딕" charset="0"/>
+                <a:ea typeface="맑은 고딕" charset="0"/>
+              </a:rPr>
+              <a:t> 번째 과정</a:t>
+            </a:r>
+            <a:endParaRPr lang="ko-KR" altLang="en-US" sz="3000" b="1">
+              <a:solidFill>
+                <a:schemeClr val="tx1"/>
+              </a:solidFill>
+              <a:latin typeface="맑은 고딕" charset="0"/>
+              <a:ea typeface="맑은 고딕" charset="0"/>
+            </a:endParaRPr>
+          </a:p>
+        </p:txBody>
+      </p:sp>
+      <p:sp>
+        <p:nvSpPr>
+          <p:cNvPr id="40" name="텍스트 상자 5"/>
+          <p:cNvSpPr txBox="1">
+            <a:spLocks/>
+          </p:cNvSpPr>
+          <p:nvPr/>
+        </p:nvSpPr>
+        <p:spPr>
+          <a:xfrm rot="0">
+            <a:off x="1410335" y="5208905"/>
+            <a:ext cx="3960495" cy="954405"/>
+          </a:xfrm>
+          <a:prstGeom prst="rect"/>
+          <a:noFill/>
+          <a:ln w="0">
+            <a:noFill/>
+            <a:prstDash/>
+          </a:ln>
+        </p:spPr>
+        <p:txBody>
+          <a:bodyPr wrap="square" lIns="89535" tIns="46355" rIns="89535" bIns="46355" numCol="1" vert="horz" anchor="t">
+            <a:spAutoFit/>
+          </a:bodyPr>
+          <a:lstStyle/>
+          <a:p>
+            <a:pPr marL="0" indent="0" rtl="0" algn="l" defTabSz="914400" eaLnBrk="1" latinLnBrk="0" hangingPunct="1">
+              <a:buFontTx/>
+              <a:buNone/>
+            </a:pPr>
+            <a:r>
+              <a:rPr lang="ko-KR" sz="2000" b="1">
+                <a:solidFill>
+                  <a:srgbClr val="0611F2"/>
+                </a:solidFill>
+                <a:latin typeface="맑은 고딕" charset="0"/>
+                <a:ea typeface="맑은 고딕" charset="0"/>
+              </a:rPr>
+              <a:t>19</a:t>
+            </a:r>
+            <a:r>
+              <a:rPr sz="2000" b="1">
+                <a:solidFill>
+                  <a:srgbClr val="0611F2"/>
+                </a:solidFill>
+                <a:latin typeface="맑은 고딕" charset="0"/>
+                <a:ea typeface="맑은 고딕" charset="0"/>
+              </a:rPr>
+              <a:t>. </a:t>
+            </a:r>
+            <a:r>
+              <a:rPr lang="ko-KR" sz="1800">
+                <a:latin typeface="맑은 고딕" charset="0"/>
+                <a:ea typeface="맑은 고딕" charset="0"/>
+              </a:rPr>
+              <a:t>그런 다음 Sensor 스크립트에서 비디오 플레이어 컴포넌트를 가져오도록 설정합니다.</a:t>
+            </a:r>
+            <a:endParaRPr lang="ko-KR" altLang="en-US" sz="1800">
+              <a:latin typeface="맑은 고딕" charset="0"/>
+              <a:ea typeface="맑은 고딕" charset="0"/>
+            </a:endParaRPr>
+          </a:p>
+        </p:txBody>
+      </p:sp>
+      <p:pic>
+        <p:nvPicPr>
+          <p:cNvPr id="41" name="그림 12" descr="C:/Users/Admin1/AppData/Roaming/PolarisOffice/ETemp/12984_9424048/fImage1165618141.png"/>
+          <p:cNvPicPr>
+            <a:picLocks noChangeAspect="1"/>
+          </p:cNvPicPr>
+          <p:nvPr/>
+        </p:nvPicPr>
+        <p:blipFill rotWithShape="1">
+          <a:blip r:embed="rId2" cstate="print">
+            <a:extLst>
+              <a:ext uri="{28A0092B-C50C-407E-A947-70E740481C1C}">
+                <a14:useLocalDpi xmlns:a14="http://schemas.microsoft.com/office/drawing/2010/main" val="0"/>
+              </a:ext>
+            </a:extLst>
+          </a:blip>
+          <a:stretch>
+            <a:fillRect/>
+          </a:stretch>
+        </p:blipFill>
+        <p:spPr>
+          <a:xfrm rot="0">
+            <a:off x="1421130" y="1471295"/>
+            <a:ext cx="3957955" cy="3600450"/>
+          </a:xfrm>
+          <a:prstGeom prst="roundRect"/>
+          <a:solidFill>
+            <a:srgbClr val="EDEDED"/>
+          </a:solidFill>
         </p:spPr>
       </p:pic>
     </p:spTree>

</xml_diff>